<commit_message>
Update ppt diagram files
</commit_message>
<xml_diff>
--- a/docs/diagrams/HighLevelSequenceDiagrams.pptx
+++ b/docs/diagrams/HighLevelSequenceDiagrams.pptx
@@ -107,6 +107,22 @@
       </a:defRPr>
     </a:lvl9pPr>
   </p:defaultTextStyle>
+  <p:extLst>
+    <p:ext uri="{EFAFB233-063F-42B5-8137-9DF3F51BA10A}">
+      <p15:sldGuideLst xmlns:p15="http://schemas.microsoft.com/office/powerpoint/2012/main">
+        <p15:guide id="1" orient="horz" pos="1488">
+          <p15:clr>
+            <a:srgbClr val="A4A3A4"/>
+          </p15:clr>
+        </p15:guide>
+        <p15:guide id="2" pos="2880">
+          <p15:clr>
+            <a:srgbClr val="A4A3A4"/>
+          </p15:clr>
+        </p15:guide>
+      </p15:sldGuideLst>
+    </p:ext>
+  </p:extLst>
 </p:presentation>
 </file>
 
@@ -192,7 +208,7 @@
           <a:p>
             <a:fld id="{F5CC4B3F-88C1-4FFA-B1B6-F41C21DC6924}" type="datetimeFigureOut">
               <a:rPr lang="en-US" smtClean="0"/>
-              <a:t>10/16/2016</a:t>
+              <a:t>4/1/2019</a:t>
             </a:fld>
             <a:endParaRPr lang="en-US"/>
           </a:p>
@@ -256,38 +272,37 @@
           <a:p>
             <a:pPr lvl="0"/>
             <a:r>
-              <a:rPr lang="en-US" smtClean="0"/>
+              <a:rPr lang="en-US"/>
               <a:t>Click to edit Master text styles</a:t>
             </a:r>
           </a:p>
           <a:p>
             <a:pPr lvl="1"/>
             <a:r>
-              <a:rPr lang="en-US" smtClean="0"/>
+              <a:rPr lang="en-US"/>
               <a:t>Second level</a:t>
             </a:r>
           </a:p>
           <a:p>
             <a:pPr lvl="2"/>
             <a:r>
-              <a:rPr lang="en-US" smtClean="0"/>
+              <a:rPr lang="en-US"/>
               <a:t>Third level</a:t>
             </a:r>
           </a:p>
           <a:p>
             <a:pPr lvl="3"/>
             <a:r>
-              <a:rPr lang="en-US" smtClean="0"/>
+              <a:rPr lang="en-US"/>
               <a:t>Fourth level</a:t>
             </a:r>
           </a:p>
           <a:p>
             <a:pPr lvl="4"/>
             <a:r>
-              <a:rPr lang="en-US" smtClean="0"/>
+              <a:rPr lang="en-US"/>
               <a:t>Fifth level</a:t>
             </a:r>
-            <a:endParaRPr lang="en-US"/>
           </a:p>
         </p:txBody>
       </p:sp>
@@ -498,10 +513,9 @@
           <a:lstStyle/>
           <a:p>
             <a:r>
-              <a:rPr lang="en-US" smtClean="0"/>
+              <a:rPr lang="en-US"/>
               <a:t>Click to edit Master title style</a:t>
             </a:r>
-            <a:endParaRPr lang="en-US"/>
           </a:p>
         </p:txBody>
       </p:sp>
@@ -617,10 +631,9 @@
           </a:lstStyle>
           <a:p>
             <a:r>
-              <a:rPr lang="en-US" smtClean="0"/>
+              <a:rPr lang="en-US"/>
               <a:t>Click to edit Master subtitle style</a:t>
             </a:r>
-            <a:endParaRPr lang="en-US"/>
           </a:p>
         </p:txBody>
       </p:sp>
@@ -641,7 +654,7 @@
           <a:p>
             <a:fld id="{78C97017-6FC3-485B-9764-EAC9E56C1D49}" type="datetimeFigureOut">
               <a:rPr lang="en-US" smtClean="0"/>
-              <a:t>10/16/2016</a:t>
+              <a:t>4/1/2019</a:t>
             </a:fld>
             <a:endParaRPr lang="en-US"/>
           </a:p>
@@ -735,10 +748,9 @@
           <a:lstStyle/>
           <a:p>
             <a:r>
-              <a:rPr lang="en-US" smtClean="0"/>
+              <a:rPr lang="en-US"/>
               <a:t>Click to edit Master title style</a:t>
             </a:r>
-            <a:endParaRPr lang="en-US"/>
           </a:p>
         </p:txBody>
       </p:sp>
@@ -759,38 +771,37 @@
           <a:p>
             <a:pPr lvl="0"/>
             <a:r>
-              <a:rPr lang="en-US" smtClean="0"/>
+              <a:rPr lang="en-US"/>
               <a:t>Click to edit Master text styles</a:t>
             </a:r>
           </a:p>
           <a:p>
             <a:pPr lvl="1"/>
             <a:r>
-              <a:rPr lang="en-US" smtClean="0"/>
+              <a:rPr lang="en-US"/>
               <a:t>Second level</a:t>
             </a:r>
           </a:p>
           <a:p>
             <a:pPr lvl="2"/>
             <a:r>
-              <a:rPr lang="en-US" smtClean="0"/>
+              <a:rPr lang="en-US"/>
               <a:t>Third level</a:t>
             </a:r>
           </a:p>
           <a:p>
             <a:pPr lvl="3"/>
             <a:r>
-              <a:rPr lang="en-US" smtClean="0"/>
+              <a:rPr lang="en-US"/>
               <a:t>Fourth level</a:t>
             </a:r>
           </a:p>
           <a:p>
             <a:pPr lvl="4"/>
             <a:r>
-              <a:rPr lang="en-US" smtClean="0"/>
+              <a:rPr lang="en-US"/>
               <a:t>Fifth level</a:t>
             </a:r>
-            <a:endParaRPr lang="en-US"/>
           </a:p>
         </p:txBody>
       </p:sp>
@@ -811,7 +822,7 @@
           <a:p>
             <a:fld id="{78C97017-6FC3-485B-9764-EAC9E56C1D49}" type="datetimeFigureOut">
               <a:rPr lang="en-US" smtClean="0"/>
-              <a:t>10/16/2016</a:t>
+              <a:t>4/1/2019</a:t>
             </a:fld>
             <a:endParaRPr lang="en-US"/>
           </a:p>
@@ -910,10 +921,9 @@
           <a:lstStyle/>
           <a:p>
             <a:r>
-              <a:rPr lang="en-US" smtClean="0"/>
+              <a:rPr lang="en-US"/>
               <a:t>Click to edit Master title style</a:t>
             </a:r>
-            <a:endParaRPr lang="en-US"/>
           </a:p>
         </p:txBody>
       </p:sp>
@@ -939,38 +949,37 @@
           <a:p>
             <a:pPr lvl="0"/>
             <a:r>
-              <a:rPr lang="en-US" smtClean="0"/>
+              <a:rPr lang="en-US"/>
               <a:t>Click to edit Master text styles</a:t>
             </a:r>
           </a:p>
           <a:p>
             <a:pPr lvl="1"/>
             <a:r>
-              <a:rPr lang="en-US" smtClean="0"/>
+              <a:rPr lang="en-US"/>
               <a:t>Second level</a:t>
             </a:r>
           </a:p>
           <a:p>
             <a:pPr lvl="2"/>
             <a:r>
-              <a:rPr lang="en-US" smtClean="0"/>
+              <a:rPr lang="en-US"/>
               <a:t>Third level</a:t>
             </a:r>
           </a:p>
           <a:p>
             <a:pPr lvl="3"/>
             <a:r>
-              <a:rPr lang="en-US" smtClean="0"/>
+              <a:rPr lang="en-US"/>
               <a:t>Fourth level</a:t>
             </a:r>
           </a:p>
           <a:p>
             <a:pPr lvl="4"/>
             <a:r>
-              <a:rPr lang="en-US" smtClean="0"/>
+              <a:rPr lang="en-US"/>
               <a:t>Fifth level</a:t>
             </a:r>
-            <a:endParaRPr lang="en-US"/>
           </a:p>
         </p:txBody>
       </p:sp>
@@ -991,7 +1000,7 @@
           <a:p>
             <a:fld id="{78C97017-6FC3-485B-9764-EAC9E56C1D49}" type="datetimeFigureOut">
               <a:rPr lang="en-US" smtClean="0"/>
-              <a:t>10/16/2016</a:t>
+              <a:t>4/1/2019</a:t>
             </a:fld>
             <a:endParaRPr lang="en-US"/>
           </a:p>
@@ -1085,10 +1094,9 @@
           <a:lstStyle/>
           <a:p>
             <a:r>
-              <a:rPr lang="en-US" smtClean="0"/>
+              <a:rPr lang="en-US"/>
               <a:t>Click to edit Master title style</a:t>
             </a:r>
-            <a:endParaRPr lang="en-US"/>
           </a:p>
         </p:txBody>
       </p:sp>
@@ -1109,38 +1117,37 @@
           <a:p>
             <a:pPr lvl="0"/>
             <a:r>
-              <a:rPr lang="en-US" smtClean="0"/>
+              <a:rPr lang="en-US"/>
               <a:t>Click to edit Master text styles</a:t>
             </a:r>
           </a:p>
           <a:p>
             <a:pPr lvl="1"/>
             <a:r>
-              <a:rPr lang="en-US" smtClean="0"/>
+              <a:rPr lang="en-US"/>
               <a:t>Second level</a:t>
             </a:r>
           </a:p>
           <a:p>
             <a:pPr lvl="2"/>
             <a:r>
-              <a:rPr lang="en-US" smtClean="0"/>
+              <a:rPr lang="en-US"/>
               <a:t>Third level</a:t>
             </a:r>
           </a:p>
           <a:p>
             <a:pPr lvl="3"/>
             <a:r>
-              <a:rPr lang="en-US" smtClean="0"/>
+              <a:rPr lang="en-US"/>
               <a:t>Fourth level</a:t>
             </a:r>
           </a:p>
           <a:p>
             <a:pPr lvl="4"/>
             <a:r>
-              <a:rPr lang="en-US" smtClean="0"/>
+              <a:rPr lang="en-US"/>
               <a:t>Fifth level</a:t>
             </a:r>
-            <a:endParaRPr lang="en-US"/>
           </a:p>
         </p:txBody>
       </p:sp>
@@ -1161,7 +1168,7 @@
           <a:p>
             <a:fld id="{78C97017-6FC3-485B-9764-EAC9E56C1D49}" type="datetimeFigureOut">
               <a:rPr lang="en-US" smtClean="0"/>
-              <a:t>10/16/2016</a:t>
+              <a:t>4/1/2019</a:t>
             </a:fld>
             <a:endParaRPr lang="en-US"/>
           </a:p>
@@ -1264,10 +1271,9 @@
           </a:lstStyle>
           <a:p>
             <a:r>
-              <a:rPr lang="en-US" smtClean="0"/>
+              <a:rPr lang="en-US"/>
               <a:t>Click to edit Master title style</a:t>
             </a:r>
-            <a:endParaRPr lang="en-US"/>
           </a:p>
         </p:txBody>
       </p:sp>
@@ -1384,7 +1390,7 @@
           <a:p>
             <a:pPr lvl="0"/>
             <a:r>
-              <a:rPr lang="en-US" smtClean="0"/>
+              <a:rPr lang="en-US"/>
               <a:t>Click to edit Master text styles</a:t>
             </a:r>
           </a:p>
@@ -1407,7 +1413,7 @@
           <a:p>
             <a:fld id="{78C97017-6FC3-485B-9764-EAC9E56C1D49}" type="datetimeFigureOut">
               <a:rPr lang="en-US" smtClean="0"/>
-              <a:t>10/16/2016</a:t>
+              <a:t>4/1/2019</a:t>
             </a:fld>
             <a:endParaRPr lang="en-US"/>
           </a:p>
@@ -1501,10 +1507,9 @@
           <a:lstStyle/>
           <a:p>
             <a:r>
-              <a:rPr lang="en-US" smtClean="0"/>
+              <a:rPr lang="en-US"/>
               <a:t>Click to edit Master title style</a:t>
             </a:r>
-            <a:endParaRPr lang="en-US"/>
           </a:p>
         </p:txBody>
       </p:sp>
@@ -1558,38 +1563,37 @@
           <a:p>
             <a:pPr lvl="0"/>
             <a:r>
-              <a:rPr lang="en-US" smtClean="0"/>
+              <a:rPr lang="en-US"/>
               <a:t>Click to edit Master text styles</a:t>
             </a:r>
           </a:p>
           <a:p>
             <a:pPr lvl="1"/>
             <a:r>
-              <a:rPr lang="en-US" smtClean="0"/>
+              <a:rPr lang="en-US"/>
               <a:t>Second level</a:t>
             </a:r>
           </a:p>
           <a:p>
             <a:pPr lvl="2"/>
             <a:r>
-              <a:rPr lang="en-US" smtClean="0"/>
+              <a:rPr lang="en-US"/>
               <a:t>Third level</a:t>
             </a:r>
           </a:p>
           <a:p>
             <a:pPr lvl="3"/>
             <a:r>
-              <a:rPr lang="en-US" smtClean="0"/>
+              <a:rPr lang="en-US"/>
               <a:t>Fourth level</a:t>
             </a:r>
           </a:p>
           <a:p>
             <a:pPr lvl="4"/>
             <a:r>
-              <a:rPr lang="en-US" smtClean="0"/>
+              <a:rPr lang="en-US"/>
               <a:t>Fifth level</a:t>
             </a:r>
-            <a:endParaRPr lang="en-US"/>
           </a:p>
         </p:txBody>
       </p:sp>
@@ -1643,38 +1647,37 @@
           <a:p>
             <a:pPr lvl="0"/>
             <a:r>
-              <a:rPr lang="en-US" smtClean="0"/>
+              <a:rPr lang="en-US"/>
               <a:t>Click to edit Master text styles</a:t>
             </a:r>
           </a:p>
           <a:p>
             <a:pPr lvl="1"/>
             <a:r>
-              <a:rPr lang="en-US" smtClean="0"/>
+              <a:rPr lang="en-US"/>
               <a:t>Second level</a:t>
             </a:r>
           </a:p>
           <a:p>
             <a:pPr lvl="2"/>
             <a:r>
-              <a:rPr lang="en-US" smtClean="0"/>
+              <a:rPr lang="en-US"/>
               <a:t>Third level</a:t>
             </a:r>
           </a:p>
           <a:p>
             <a:pPr lvl="3"/>
             <a:r>
-              <a:rPr lang="en-US" smtClean="0"/>
+              <a:rPr lang="en-US"/>
               <a:t>Fourth level</a:t>
             </a:r>
           </a:p>
           <a:p>
             <a:pPr lvl="4"/>
             <a:r>
-              <a:rPr lang="en-US" smtClean="0"/>
+              <a:rPr lang="en-US"/>
               <a:t>Fifth level</a:t>
             </a:r>
-            <a:endParaRPr lang="en-US"/>
           </a:p>
         </p:txBody>
       </p:sp>
@@ -1695,7 +1698,7 @@
           <a:p>
             <a:fld id="{78C97017-6FC3-485B-9764-EAC9E56C1D49}" type="datetimeFigureOut">
               <a:rPr lang="en-US" smtClean="0"/>
-              <a:t>10/16/2016</a:t>
+              <a:t>4/1/2019</a:t>
             </a:fld>
             <a:endParaRPr lang="en-US"/>
           </a:p>
@@ -1793,10 +1796,9 @@
           </a:lstStyle>
           <a:p>
             <a:r>
-              <a:rPr lang="en-US" smtClean="0"/>
+              <a:rPr lang="en-US"/>
               <a:t>Click to edit Master title style</a:t>
             </a:r>
-            <a:endParaRPr lang="en-US"/>
           </a:p>
         </p:txBody>
       </p:sp>
@@ -1859,7 +1861,7 @@
           <a:p>
             <a:pPr lvl="0"/>
             <a:r>
-              <a:rPr lang="en-US" smtClean="0"/>
+              <a:rPr lang="en-US"/>
               <a:t>Click to edit Master text styles</a:t>
             </a:r>
           </a:p>
@@ -1915,38 +1917,37 @@
           <a:p>
             <a:pPr lvl="0"/>
             <a:r>
-              <a:rPr lang="en-US" smtClean="0"/>
+              <a:rPr lang="en-US"/>
               <a:t>Click to edit Master text styles</a:t>
             </a:r>
           </a:p>
           <a:p>
             <a:pPr lvl="1"/>
             <a:r>
-              <a:rPr lang="en-US" smtClean="0"/>
+              <a:rPr lang="en-US"/>
               <a:t>Second level</a:t>
             </a:r>
           </a:p>
           <a:p>
             <a:pPr lvl="2"/>
             <a:r>
-              <a:rPr lang="en-US" smtClean="0"/>
+              <a:rPr lang="en-US"/>
               <a:t>Third level</a:t>
             </a:r>
           </a:p>
           <a:p>
             <a:pPr lvl="3"/>
             <a:r>
-              <a:rPr lang="en-US" smtClean="0"/>
+              <a:rPr lang="en-US"/>
               <a:t>Fourth level</a:t>
             </a:r>
           </a:p>
           <a:p>
             <a:pPr lvl="4"/>
             <a:r>
-              <a:rPr lang="en-US" smtClean="0"/>
+              <a:rPr lang="en-US"/>
               <a:t>Fifth level</a:t>
             </a:r>
-            <a:endParaRPr lang="en-US"/>
           </a:p>
         </p:txBody>
       </p:sp>
@@ -2009,7 +2010,7 @@
           <a:p>
             <a:pPr lvl="0"/>
             <a:r>
-              <a:rPr lang="en-US" smtClean="0"/>
+              <a:rPr lang="en-US"/>
               <a:t>Click to edit Master text styles</a:t>
             </a:r>
           </a:p>
@@ -2065,38 +2066,37 @@
           <a:p>
             <a:pPr lvl="0"/>
             <a:r>
-              <a:rPr lang="en-US" smtClean="0"/>
+              <a:rPr lang="en-US"/>
               <a:t>Click to edit Master text styles</a:t>
             </a:r>
           </a:p>
           <a:p>
             <a:pPr lvl="1"/>
             <a:r>
-              <a:rPr lang="en-US" smtClean="0"/>
+              <a:rPr lang="en-US"/>
               <a:t>Second level</a:t>
             </a:r>
           </a:p>
           <a:p>
             <a:pPr lvl="2"/>
             <a:r>
-              <a:rPr lang="en-US" smtClean="0"/>
+              <a:rPr lang="en-US"/>
               <a:t>Third level</a:t>
             </a:r>
           </a:p>
           <a:p>
             <a:pPr lvl="3"/>
             <a:r>
-              <a:rPr lang="en-US" smtClean="0"/>
+              <a:rPr lang="en-US"/>
               <a:t>Fourth level</a:t>
             </a:r>
           </a:p>
           <a:p>
             <a:pPr lvl="4"/>
             <a:r>
-              <a:rPr lang="en-US" smtClean="0"/>
+              <a:rPr lang="en-US"/>
               <a:t>Fifth level</a:t>
             </a:r>
-            <a:endParaRPr lang="en-US"/>
           </a:p>
         </p:txBody>
       </p:sp>
@@ -2117,7 +2117,7 @@
           <a:p>
             <a:fld id="{78C97017-6FC3-485B-9764-EAC9E56C1D49}" type="datetimeFigureOut">
               <a:rPr lang="en-US" smtClean="0"/>
-              <a:t>10/16/2016</a:t>
+              <a:t>4/1/2019</a:t>
             </a:fld>
             <a:endParaRPr lang="en-US"/>
           </a:p>
@@ -2211,10 +2211,9 @@
           <a:lstStyle/>
           <a:p>
             <a:r>
-              <a:rPr lang="en-US" smtClean="0"/>
+              <a:rPr lang="en-US"/>
               <a:t>Click to edit Master title style</a:t>
             </a:r>
-            <a:endParaRPr lang="en-US"/>
           </a:p>
         </p:txBody>
       </p:sp>
@@ -2235,7 +2234,7 @@
           <a:p>
             <a:fld id="{78C97017-6FC3-485B-9764-EAC9E56C1D49}" type="datetimeFigureOut">
               <a:rPr lang="en-US" smtClean="0"/>
-              <a:t>10/16/2016</a:t>
+              <a:t>4/1/2019</a:t>
             </a:fld>
             <a:endParaRPr lang="en-US"/>
           </a:p>
@@ -2330,7 +2329,7 @@
           <a:p>
             <a:fld id="{78C97017-6FC3-485B-9764-EAC9E56C1D49}" type="datetimeFigureOut">
               <a:rPr lang="en-US" smtClean="0"/>
-              <a:t>10/16/2016</a:t>
+              <a:t>4/1/2019</a:t>
             </a:fld>
             <a:endParaRPr lang="en-US"/>
           </a:p>
@@ -2433,10 +2432,9 @@
           </a:lstStyle>
           <a:p>
             <a:r>
-              <a:rPr lang="en-US" smtClean="0"/>
+              <a:rPr lang="en-US"/>
               <a:t>Click to edit Master title style</a:t>
             </a:r>
-            <a:endParaRPr lang="en-US"/>
           </a:p>
         </p:txBody>
       </p:sp>
@@ -2490,38 +2488,37 @@
           <a:p>
             <a:pPr lvl="0"/>
             <a:r>
-              <a:rPr lang="en-US" smtClean="0"/>
+              <a:rPr lang="en-US"/>
               <a:t>Click to edit Master text styles</a:t>
             </a:r>
           </a:p>
           <a:p>
             <a:pPr lvl="1"/>
             <a:r>
-              <a:rPr lang="en-US" smtClean="0"/>
+              <a:rPr lang="en-US"/>
               <a:t>Second level</a:t>
             </a:r>
           </a:p>
           <a:p>
             <a:pPr lvl="2"/>
             <a:r>
-              <a:rPr lang="en-US" smtClean="0"/>
+              <a:rPr lang="en-US"/>
               <a:t>Third level</a:t>
             </a:r>
           </a:p>
           <a:p>
             <a:pPr lvl="3"/>
             <a:r>
-              <a:rPr lang="en-US" smtClean="0"/>
+              <a:rPr lang="en-US"/>
               <a:t>Fourth level</a:t>
             </a:r>
           </a:p>
           <a:p>
             <a:pPr lvl="4"/>
             <a:r>
-              <a:rPr lang="en-US" smtClean="0"/>
+              <a:rPr lang="en-US"/>
               <a:t>Fifth level</a:t>
             </a:r>
-            <a:endParaRPr lang="en-US"/>
           </a:p>
         </p:txBody>
       </p:sp>
@@ -2584,7 +2581,7 @@
           <a:p>
             <a:pPr lvl="0"/>
             <a:r>
-              <a:rPr lang="en-US" smtClean="0"/>
+              <a:rPr lang="en-US"/>
               <a:t>Click to edit Master text styles</a:t>
             </a:r>
           </a:p>
@@ -2607,7 +2604,7 @@
           <a:p>
             <a:fld id="{78C97017-6FC3-485B-9764-EAC9E56C1D49}" type="datetimeFigureOut">
               <a:rPr lang="en-US" smtClean="0"/>
-              <a:t>10/16/2016</a:t>
+              <a:t>4/1/2019</a:t>
             </a:fld>
             <a:endParaRPr lang="en-US"/>
           </a:p>
@@ -2710,10 +2707,9 @@
           </a:lstStyle>
           <a:p>
             <a:r>
-              <a:rPr lang="en-US" smtClean="0"/>
+              <a:rPr lang="en-US"/>
               <a:t>Click to edit Master title style</a:t>
             </a:r>
-            <a:endParaRPr lang="en-US"/>
           </a:p>
         </p:txBody>
       </p:sp>
@@ -2837,7 +2833,7 @@
           <a:p>
             <a:pPr lvl="0"/>
             <a:r>
-              <a:rPr lang="en-US" smtClean="0"/>
+              <a:rPr lang="en-US"/>
               <a:t>Click to edit Master text styles</a:t>
             </a:r>
           </a:p>
@@ -2860,7 +2856,7 @@
           <a:p>
             <a:fld id="{78C97017-6FC3-485B-9764-EAC9E56C1D49}" type="datetimeFigureOut">
               <a:rPr lang="en-US" smtClean="0"/>
-              <a:t>10/16/2016</a:t>
+              <a:t>4/1/2019</a:t>
             </a:fld>
             <a:endParaRPr lang="en-US"/>
           </a:p>
@@ -2969,10 +2965,9 @@
           <a:lstStyle/>
           <a:p>
             <a:r>
-              <a:rPr lang="en-US" smtClean="0"/>
+              <a:rPr lang="en-US"/>
               <a:t>Click to edit Master title style</a:t>
             </a:r>
-            <a:endParaRPr lang="en-US"/>
           </a:p>
         </p:txBody>
       </p:sp>
@@ -3003,38 +2998,37 @@
           <a:p>
             <a:pPr lvl="0"/>
             <a:r>
-              <a:rPr lang="en-US" smtClean="0"/>
+              <a:rPr lang="en-US"/>
               <a:t>Click to edit Master text styles</a:t>
             </a:r>
           </a:p>
           <a:p>
             <a:pPr lvl="1"/>
             <a:r>
-              <a:rPr lang="en-US" smtClean="0"/>
+              <a:rPr lang="en-US"/>
               <a:t>Second level</a:t>
             </a:r>
           </a:p>
           <a:p>
             <a:pPr lvl="2"/>
             <a:r>
-              <a:rPr lang="en-US" smtClean="0"/>
+              <a:rPr lang="en-US"/>
               <a:t>Third level</a:t>
             </a:r>
           </a:p>
           <a:p>
             <a:pPr lvl="3"/>
             <a:r>
-              <a:rPr lang="en-US" smtClean="0"/>
+              <a:rPr lang="en-US"/>
               <a:t>Fourth level</a:t>
             </a:r>
           </a:p>
           <a:p>
             <a:pPr lvl="4"/>
             <a:r>
-              <a:rPr lang="en-US" smtClean="0"/>
+              <a:rPr lang="en-US"/>
               <a:t>Fifth level</a:t>
             </a:r>
-            <a:endParaRPr lang="en-US"/>
           </a:p>
         </p:txBody>
       </p:sp>
@@ -3073,7 +3067,7 @@
           <a:p>
             <a:fld id="{78C97017-6FC3-485B-9764-EAC9E56C1D49}" type="datetimeFigureOut">
               <a:rPr lang="en-US" smtClean="0"/>
-              <a:t>10/16/2016</a:t>
+              <a:t>4/1/2019</a:t>
             </a:fld>
             <a:endParaRPr lang="en-US"/>
           </a:p>
@@ -3492,7 +3486,7 @@
           <a:p>
             <a:pPr algn="ctr"/>
             <a:r>
-              <a:rPr lang="en-US" sz="1600" dirty="0" smtClean="0">
+              <a:rPr lang="en-US" sz="1600" dirty="0">
                 <a:solidFill>
                   <a:schemeClr val="bg1"/>
                 </a:solidFill>
@@ -3856,7 +3850,7 @@
           <a:p>
             <a:pPr algn="ctr"/>
             <a:r>
-              <a:rPr lang="en-US" sz="1600" dirty="0" smtClean="0">
+              <a:rPr lang="en-US" sz="1600" dirty="0">
                 <a:solidFill>
                   <a:schemeClr val="bg1"/>
                 </a:solidFill>
@@ -4003,7 +3997,7 @@
           <a:p>
             <a:pPr algn="ctr"/>
             <a:r>
-              <a:rPr lang="en-US" sz="1600" dirty="0" smtClean="0">
+              <a:rPr lang="en-US" sz="1600" dirty="0">
                 <a:solidFill>
                   <a:schemeClr val="bg1"/>
                 </a:solidFill>
@@ -4150,7 +4144,7 @@
         </p:nvSpPr>
         <p:spPr>
           <a:xfrm>
-            <a:off x="466818" y="1345880"/>
+            <a:off x="674030" y="1107800"/>
             <a:ext cx="860170" cy="215444"/>
           </a:xfrm>
           <a:prstGeom prst="rect">
@@ -4165,10 +4159,9 @@
           <a:lstStyle/>
           <a:p>
             <a:r>
-              <a:rPr lang="en-US" sz="1400" dirty="0" smtClean="0"/>
+              <a:rPr lang="en-US" sz="1400" dirty="0"/>
               <a:t>delete 1</a:t>
             </a:r>
-            <a:endParaRPr lang="en-US" sz="1400" dirty="0"/>
           </a:p>
         </p:txBody>
       </p:sp>
@@ -4216,7 +4209,7 @@
         </p:nvSpPr>
         <p:spPr>
           <a:xfrm>
-            <a:off x="2166172" y="1453379"/>
+            <a:off x="2076082" y="1218033"/>
             <a:ext cx="1424846" cy="215444"/>
           </a:xfrm>
           <a:prstGeom prst="rect">
@@ -4231,18 +4224,13 @@
           <a:lstStyle/>
           <a:p>
             <a:r>
-              <a:rPr lang="en-US" sz="1400" dirty="0" smtClean="0">
+              <a:rPr lang="en-US" sz="1400" dirty="0">
                 <a:solidFill>
                   <a:srgbClr val="0070C0"/>
                 </a:solidFill>
               </a:rPr>
               <a:t>execute(“delete 1”)</a:t>
             </a:r>
-            <a:endParaRPr lang="en-US" sz="1400" dirty="0">
-              <a:solidFill>
-                <a:srgbClr val="0070C0"/>
-              </a:solidFill>
-            </a:endParaRPr>
           </a:p>
         </p:txBody>
       </p:sp>
@@ -4290,7 +4278,7 @@
         </p:nvSpPr>
         <p:spPr>
           <a:xfrm>
-            <a:off x="4299772" y="1542583"/>
+            <a:off x="4276543" y="1316671"/>
             <a:ext cx="1424846" cy="215444"/>
           </a:xfrm>
           <a:prstGeom prst="rect">
@@ -4305,88 +4293,21 @@
           <a:lstStyle/>
           <a:p>
             <a:r>
-              <a:rPr lang="en-US" sz="1400" dirty="0" err="1" smtClean="0">
+              <a:rPr lang="en-US" sz="1400" dirty="0" err="1">
                 <a:solidFill>
                   <a:srgbClr val="7030A0"/>
                 </a:solidFill>
               </a:rPr>
-              <a:t>deletePerson</a:t>
-            </a:r>
-            <a:r>
-              <a:rPr lang="en-US" sz="1400" dirty="0" smtClean="0">
+              <a:t>deleteEntry</a:t>
+            </a:r>
+            <a:r>
+              <a:rPr lang="en-US" sz="1400" dirty="0">
                 <a:solidFill>
                   <a:srgbClr val="7030A0"/>
                 </a:solidFill>
               </a:rPr>
-              <a:t>(p)</a:t>
-            </a:r>
-            <a:endParaRPr lang="en-US" sz="1400" dirty="0">
-              <a:solidFill>
-                <a:srgbClr val="7030A0"/>
-              </a:solidFill>
-            </a:endParaRPr>
-          </a:p>
-        </p:txBody>
-      </p:sp>
-      <p:sp>
-        <p:nvSpPr>
-          <p:cNvPr id="33" name="TextBox 32"/>
-          <p:cNvSpPr txBox="1"/>
-          <p:nvPr/>
-        </p:nvSpPr>
-        <p:spPr>
-          <a:xfrm>
-            <a:off x="6074030" y="1687656"/>
-            <a:ext cx="2438400" cy="215444"/>
-          </a:xfrm>
-          <a:prstGeom prst="rect">
-            <a:avLst/>
-          </a:prstGeom>
-          <a:noFill/>
-        </p:spPr>
-        <p:txBody>
-          <a:bodyPr wrap="square" lIns="0" tIns="0" rIns="0" bIns="0" rtlCol="0">
-            <a:spAutoFit/>
-          </a:bodyPr>
-          <a:lstStyle/>
-          <a:p>
-            <a:r>
-              <a:rPr lang="en-US" sz="1400" dirty="0" smtClean="0">
-                <a:solidFill>
-                  <a:schemeClr val="accent5">
-                    <a:lumMod val="75000"/>
-                  </a:schemeClr>
-                </a:solidFill>
-              </a:rPr>
-              <a:t>post(</a:t>
-            </a:r>
-            <a:r>
-              <a:rPr lang="en-US" sz="1400" dirty="0" err="1" smtClean="0">
-                <a:solidFill>
-                  <a:schemeClr val="accent5">
-                    <a:lumMod val="75000"/>
-                  </a:schemeClr>
-                </a:solidFill>
-              </a:rPr>
-              <a:t>AddressBookChangedEvent</a:t>
-            </a:r>
-            <a:r>
-              <a:rPr lang="en-US" sz="1400" dirty="0" smtClean="0">
-                <a:solidFill>
-                  <a:schemeClr val="accent5">
-                    <a:lumMod val="75000"/>
-                  </a:schemeClr>
-                </a:solidFill>
-              </a:rPr>
-              <a:t>)</a:t>
-            </a:r>
-            <a:endParaRPr lang="en-US" sz="1400" dirty="0">
-              <a:solidFill>
-                <a:schemeClr val="accent5">
-                  <a:lumMod val="75000"/>
-                </a:schemeClr>
-              </a:solidFill>
-            </a:endParaRPr>
+              <a:t>(e)</a:t>
+            </a:r>
           </a:p>
         </p:txBody>
       </p:sp>
@@ -4504,15 +4425,308 @@
           </a:fontRef>
         </p:style>
       </p:cxnSp>
-      <p:sp>
-        <p:nvSpPr>
-          <p:cNvPr id="39" name="Rectangle 62"/>
+      <p:cxnSp>
+        <p:nvCxnSpPr>
+          <p:cNvPr id="42" name="Straight Arrow Connector 41"/>
+          <p:cNvCxnSpPr>
+            <a:cxnSpLocks/>
+            <a:stCxn id="21" idx="3"/>
+          </p:cNvCxnSpPr>
+          <p:nvPr/>
+        </p:nvCxnSpPr>
+        <p:spPr>
+          <a:xfrm>
+            <a:off x="5933598" y="1864105"/>
+            <a:ext cx="2097610" cy="1932"/>
+          </a:xfrm>
+          <a:prstGeom prst="straightConnector1">
+            <a:avLst/>
+          </a:prstGeom>
+          <a:ln w="19050">
+            <a:solidFill>
+              <a:srgbClr val="7030A0"/>
+            </a:solidFill>
+            <a:tailEnd type="arrow"/>
+          </a:ln>
+        </p:spPr>
+        <p:style>
+          <a:lnRef idx="1">
+            <a:schemeClr val="accent1"/>
+          </a:lnRef>
+          <a:fillRef idx="0">
+            <a:schemeClr val="accent1"/>
+          </a:fillRef>
+          <a:effectRef idx="0">
+            <a:schemeClr val="accent1"/>
+          </a:effectRef>
+          <a:fontRef idx="minor">
+            <a:schemeClr val="tx1"/>
+          </a:fontRef>
+        </p:style>
+      </p:cxnSp>
+      <p:sp>
+        <p:nvSpPr>
+          <p:cNvPr id="53" name="Rectangle 62"/>
           <p:cNvSpPr/>
           <p:nvPr/>
         </p:nvSpPr>
         <p:spPr>
           <a:xfrm>
-            <a:off x="7696200" y="591251"/>
+            <a:off x="7494792" y="612522"/>
+            <a:ext cx="1093635" cy="346760"/>
+          </a:xfrm>
+          <a:prstGeom prst="rect">
+            <a:avLst/>
+          </a:prstGeom>
+          <a:solidFill>
+            <a:schemeClr val="accent6">
+              <a:lumMod val="75000"/>
+            </a:schemeClr>
+          </a:solidFill>
+          <a:ln w="19050">
+            <a:solidFill>
+              <a:schemeClr val="accent6">
+                <a:lumMod val="75000"/>
+              </a:schemeClr>
+            </a:solidFill>
+          </a:ln>
+          <a:effectLst/>
+        </p:spPr>
+        <p:style>
+          <a:lnRef idx="1">
+            <a:schemeClr val="accent2"/>
+          </a:lnRef>
+          <a:fillRef idx="2">
+            <a:schemeClr val="accent2"/>
+          </a:fillRef>
+          <a:effectRef idx="1">
+            <a:schemeClr val="accent2"/>
+          </a:effectRef>
+          <a:fontRef idx="minor">
+            <a:schemeClr val="dk1"/>
+          </a:fontRef>
+        </p:style>
+        <p:txBody>
+          <a:bodyPr rtlCol="0" anchor="ctr"/>
+          <a:lstStyle/>
+          <a:p>
+            <a:pPr algn="ctr"/>
+            <a:r>
+              <a:rPr lang="en-US" sz="1600" dirty="0">
+                <a:solidFill>
+                  <a:schemeClr val="bg1"/>
+                </a:solidFill>
+              </a:rPr>
+              <a:t>:Storage</a:t>
+            </a:r>
+            <a:endParaRPr lang="en-SG" sz="1600" dirty="0">
+              <a:solidFill>
+                <a:schemeClr val="bg1"/>
+              </a:solidFill>
+            </a:endParaRPr>
+          </a:p>
+        </p:txBody>
+      </p:sp>
+      <p:cxnSp>
+        <p:nvCxnSpPr>
+          <p:cNvPr id="54" name="Straight Connector 53"/>
+          <p:cNvCxnSpPr>
+            <a:cxnSpLocks/>
+          </p:cNvCxnSpPr>
+          <p:nvPr/>
+        </p:nvCxnSpPr>
+        <p:spPr>
+          <a:xfrm>
+            <a:off x="8082543" y="925835"/>
+            <a:ext cx="7684" cy="1768821"/>
+          </a:xfrm>
+          <a:prstGeom prst="line">
+            <a:avLst/>
+          </a:prstGeom>
+          <a:ln w="19050">
+            <a:solidFill>
+              <a:schemeClr val="accent6">
+                <a:lumMod val="75000"/>
+              </a:schemeClr>
+            </a:solidFill>
+            <a:prstDash val="sysDash"/>
+          </a:ln>
+          <a:effectLst/>
+        </p:spPr>
+        <p:style>
+          <a:lnRef idx="1">
+            <a:schemeClr val="accent1"/>
+          </a:lnRef>
+          <a:fillRef idx="2">
+            <a:schemeClr val="accent1"/>
+          </a:fillRef>
+          <a:effectRef idx="1">
+            <a:schemeClr val="accent1"/>
+          </a:effectRef>
+          <a:fontRef idx="minor">
+            <a:schemeClr val="dk1"/>
+          </a:fontRef>
+        </p:style>
+      </p:cxnSp>
+      <p:sp>
+        <p:nvSpPr>
+          <p:cNvPr id="55" name="Rectangle 54"/>
+          <p:cNvSpPr/>
+          <p:nvPr/>
+        </p:nvSpPr>
+        <p:spPr>
+          <a:xfrm>
+            <a:off x="8027988" y="1866037"/>
+            <a:ext cx="124478" cy="287409"/>
+          </a:xfrm>
+          <a:prstGeom prst="rect">
+            <a:avLst/>
+          </a:prstGeom>
+          <a:solidFill>
+            <a:schemeClr val="accent6">
+              <a:lumMod val="75000"/>
+            </a:schemeClr>
+          </a:solidFill>
+          <a:ln>
+            <a:solidFill>
+              <a:schemeClr val="accent6">
+                <a:lumMod val="75000"/>
+              </a:schemeClr>
+            </a:solidFill>
+          </a:ln>
+          <a:effectLst/>
+        </p:spPr>
+        <p:style>
+          <a:lnRef idx="1">
+            <a:schemeClr val="accent3"/>
+          </a:lnRef>
+          <a:fillRef idx="2">
+            <a:schemeClr val="accent3"/>
+          </a:fillRef>
+          <a:effectRef idx="1">
+            <a:schemeClr val="accent3"/>
+          </a:effectRef>
+          <a:fontRef idx="minor">
+            <a:schemeClr val="dk1"/>
+          </a:fontRef>
+        </p:style>
+        <p:txBody>
+          <a:bodyPr rtlCol="0" anchor="ctr"/>
+          <a:lstStyle/>
+          <a:p>
+            <a:pPr algn="ctr"/>
+            <a:endParaRPr lang="en-SG" sz="1400">
+              <a:solidFill>
+                <a:schemeClr val="dk1"/>
+              </a:solidFill>
+            </a:endParaRPr>
+          </a:p>
+        </p:txBody>
+      </p:sp>
+      <p:sp>
+        <p:nvSpPr>
+          <p:cNvPr id="62" name="TextBox 61"/>
+          <p:cNvSpPr txBox="1"/>
+          <p:nvPr/>
+        </p:nvSpPr>
+        <p:spPr>
+          <a:xfrm>
+            <a:off x="1810094" y="4797674"/>
+            <a:ext cx="2716635" cy="215444"/>
+          </a:xfrm>
+          <a:prstGeom prst="rect">
+            <a:avLst/>
+          </a:prstGeom>
+          <a:noFill/>
+        </p:spPr>
+        <p:txBody>
+          <a:bodyPr wrap="square" lIns="0" tIns="0" rIns="0" bIns="0" rtlCol="0">
+            <a:spAutoFit/>
+          </a:bodyPr>
+          <a:lstStyle/>
+          <a:p>
+            <a:r>
+              <a:rPr lang="en-US" sz="1400" dirty="0">
+                <a:solidFill>
+                  <a:schemeClr val="accent5">
+                    <a:lumMod val="75000"/>
+                  </a:schemeClr>
+                </a:solidFill>
+              </a:rPr>
+              <a:t>post(</a:t>
+            </a:r>
+            <a:r>
+              <a:rPr lang="en-US" sz="1400" dirty="0" err="1">
+                <a:solidFill>
+                  <a:schemeClr val="accent5">
+                    <a:lumMod val="75000"/>
+                  </a:schemeClr>
+                </a:solidFill>
+              </a:rPr>
+              <a:t>EntryBookChangedEvent</a:t>
+            </a:r>
+            <a:r>
+              <a:rPr lang="en-US" sz="1400" dirty="0">
+                <a:solidFill>
+                  <a:schemeClr val="accent5">
+                    <a:lumMod val="75000"/>
+                  </a:schemeClr>
+                </a:solidFill>
+              </a:rPr>
+              <a:t>)</a:t>
+            </a:r>
+          </a:p>
+        </p:txBody>
+      </p:sp>
+      <p:cxnSp>
+        <p:nvCxnSpPr>
+          <p:cNvPr id="63" name="Straight Arrow Connector 62"/>
+          <p:cNvCxnSpPr/>
+          <p:nvPr/>
+        </p:nvCxnSpPr>
+        <p:spPr>
+          <a:xfrm flipH="1">
+            <a:off x="4526729" y="5623071"/>
+            <a:ext cx="3383941" cy="0"/>
+          </a:xfrm>
+          <a:prstGeom prst="straightConnector1">
+            <a:avLst/>
+          </a:prstGeom>
+          <a:ln w="19050">
+            <a:solidFill>
+              <a:schemeClr val="accent6">
+                <a:lumMod val="75000"/>
+              </a:schemeClr>
+            </a:solidFill>
+            <a:prstDash val="sysDash"/>
+            <a:headEnd type="none" w="med" len="med"/>
+            <a:tailEnd type="arrow" w="med" len="med"/>
+          </a:ln>
+        </p:spPr>
+        <p:style>
+          <a:lnRef idx="1">
+            <a:schemeClr val="accent1"/>
+          </a:lnRef>
+          <a:fillRef idx="0">
+            <a:schemeClr val="accent1"/>
+          </a:fillRef>
+          <a:effectRef idx="0">
+            <a:schemeClr val="accent1"/>
+          </a:effectRef>
+          <a:fontRef idx="minor">
+            <a:schemeClr val="tx1"/>
+          </a:fontRef>
+        </p:style>
+      </p:cxnSp>
+      <p:sp>
+        <p:nvSpPr>
+          <p:cNvPr id="66" name="Rectangle 62"/>
+          <p:cNvSpPr/>
+          <p:nvPr/>
+        </p:nvSpPr>
+        <p:spPr>
+          <a:xfrm>
+            <a:off x="3791146" y="4295233"/>
             <a:ext cx="1371600" cy="346760"/>
           </a:xfrm>
           <a:prstGeom prst="rect">
@@ -4552,7 +4766,7 @@
           <a:p>
             <a:pPr algn="ctr"/>
             <a:r>
-              <a:rPr lang="en-US" sz="1600" dirty="0" smtClean="0">
+              <a:rPr lang="en-US" sz="1600" dirty="0">
                 <a:solidFill>
                   <a:schemeClr val="bg1"/>
                 </a:solidFill>
@@ -4560,507 +4774,7 @@
               <a:t>:</a:t>
             </a:r>
             <a:r>
-              <a:rPr lang="en-US" sz="1600" dirty="0" err="1" smtClean="0">
-                <a:solidFill>
-                  <a:schemeClr val="bg1"/>
-                </a:solidFill>
-              </a:rPr>
-              <a:t>EventsCenter</a:t>
-            </a:r>
-            <a:endParaRPr lang="en-SG" sz="1600" dirty="0">
-              <a:solidFill>
-                <a:schemeClr val="bg1"/>
-              </a:solidFill>
-            </a:endParaRPr>
-          </a:p>
-        </p:txBody>
-      </p:sp>
-      <p:cxnSp>
-        <p:nvCxnSpPr>
-          <p:cNvPr id="40" name="Straight Connector 39"/>
-          <p:cNvCxnSpPr/>
-          <p:nvPr/>
-        </p:nvCxnSpPr>
-        <p:spPr>
-          <a:xfrm>
-            <a:off x="8616802" y="944305"/>
-            <a:ext cx="0" cy="1723059"/>
-          </a:xfrm>
-          <a:prstGeom prst="line">
-            <a:avLst/>
-          </a:prstGeom>
-          <a:ln w="19050">
-            <a:solidFill>
-              <a:schemeClr val="accent5">
-                <a:lumMod val="75000"/>
-              </a:schemeClr>
-            </a:solidFill>
-            <a:prstDash val="sysDash"/>
-          </a:ln>
-          <a:effectLst/>
-        </p:spPr>
-        <p:style>
-          <a:lnRef idx="1">
-            <a:schemeClr val="accent1"/>
-          </a:lnRef>
-          <a:fillRef idx="2">
-            <a:schemeClr val="accent1"/>
-          </a:fillRef>
-          <a:effectRef idx="1">
-            <a:schemeClr val="accent1"/>
-          </a:effectRef>
-          <a:fontRef idx="minor">
-            <a:schemeClr val="dk1"/>
-          </a:fontRef>
-        </p:style>
-      </p:cxnSp>
-      <p:sp>
-        <p:nvSpPr>
-          <p:cNvPr id="41" name="Rectangle 40"/>
-          <p:cNvSpPr/>
-          <p:nvPr/>
-        </p:nvSpPr>
-        <p:spPr>
-          <a:xfrm>
-            <a:off x="8544794" y="1961202"/>
-            <a:ext cx="142006" cy="176787"/>
-          </a:xfrm>
-          <a:prstGeom prst="rect">
-            <a:avLst/>
-          </a:prstGeom>
-          <a:solidFill>
-            <a:schemeClr val="accent5">
-              <a:lumMod val="75000"/>
-            </a:schemeClr>
-          </a:solidFill>
-          <a:ln>
-            <a:solidFill>
-              <a:schemeClr val="accent5">
-                <a:lumMod val="75000"/>
-              </a:schemeClr>
-            </a:solidFill>
-          </a:ln>
-          <a:effectLst/>
-        </p:spPr>
-        <p:style>
-          <a:lnRef idx="1">
-            <a:schemeClr val="accent3"/>
-          </a:lnRef>
-          <a:fillRef idx="2">
-            <a:schemeClr val="accent3"/>
-          </a:fillRef>
-          <a:effectRef idx="1">
-            <a:schemeClr val="accent3"/>
-          </a:effectRef>
-          <a:fontRef idx="minor">
-            <a:schemeClr val="dk1"/>
-          </a:fontRef>
-        </p:style>
-        <p:txBody>
-          <a:bodyPr rtlCol="0" anchor="ctr"/>
-          <a:lstStyle/>
-          <a:p>
-            <a:pPr algn="ctr"/>
-            <a:endParaRPr lang="en-SG" sz="1400">
-              <a:solidFill>
-                <a:schemeClr val="dk1"/>
-              </a:solidFill>
-            </a:endParaRPr>
-          </a:p>
-        </p:txBody>
-      </p:sp>
-      <p:cxnSp>
-        <p:nvCxnSpPr>
-          <p:cNvPr id="42" name="Straight Arrow Connector 41"/>
-          <p:cNvCxnSpPr/>
-          <p:nvPr/>
-        </p:nvCxnSpPr>
-        <p:spPr>
-          <a:xfrm>
-            <a:off x="5943992" y="1961202"/>
-            <a:ext cx="2568438" cy="0"/>
-          </a:xfrm>
-          <a:prstGeom prst="straightConnector1">
-            <a:avLst/>
-          </a:prstGeom>
-          <a:ln w="19050">
-            <a:solidFill>
-              <a:srgbClr val="7030A0"/>
-            </a:solidFill>
-            <a:tailEnd type="arrow"/>
-          </a:ln>
-        </p:spPr>
-        <p:style>
-          <a:lnRef idx="1">
-            <a:schemeClr val="accent1"/>
-          </a:lnRef>
-          <a:fillRef idx="0">
-            <a:schemeClr val="accent1"/>
-          </a:fillRef>
-          <a:effectRef idx="0">
-            <a:schemeClr val="accent1"/>
-          </a:effectRef>
-          <a:fontRef idx="minor">
-            <a:schemeClr val="tx1"/>
-          </a:fontRef>
-        </p:style>
-      </p:cxnSp>
-      <p:cxnSp>
-        <p:nvCxnSpPr>
-          <p:cNvPr id="44" name="Straight Arrow Connector 43"/>
-          <p:cNvCxnSpPr/>
-          <p:nvPr/>
-        </p:nvCxnSpPr>
-        <p:spPr>
-          <a:xfrm>
-            <a:off x="5943992" y="2137989"/>
-            <a:ext cx="2549946" cy="0"/>
-          </a:xfrm>
-          <a:prstGeom prst="straightConnector1">
-            <a:avLst/>
-          </a:prstGeom>
-          <a:ln w="19050">
-            <a:solidFill>
-              <a:schemeClr val="accent5">
-                <a:lumMod val="75000"/>
-              </a:schemeClr>
-            </a:solidFill>
-            <a:prstDash val="sysDash"/>
-            <a:headEnd type="arrow" w="med" len="med"/>
-            <a:tailEnd type="none" w="med" len="med"/>
-          </a:ln>
-        </p:spPr>
-        <p:style>
-          <a:lnRef idx="1">
-            <a:schemeClr val="accent1"/>
-          </a:lnRef>
-          <a:fillRef idx="0">
-            <a:schemeClr val="accent1"/>
-          </a:fillRef>
-          <a:effectRef idx="0">
-            <a:schemeClr val="accent1"/>
-          </a:effectRef>
-          <a:fontRef idx="minor">
-            <a:schemeClr val="tx1"/>
-          </a:fontRef>
-        </p:style>
-      </p:cxnSp>
-      <p:sp>
-        <p:nvSpPr>
-          <p:cNvPr id="53" name="Rectangle 62"/>
-          <p:cNvSpPr/>
-          <p:nvPr/>
-        </p:nvSpPr>
-        <p:spPr>
-          <a:xfrm>
-            <a:off x="7370178" y="4278322"/>
-            <a:ext cx="1093635" cy="346760"/>
-          </a:xfrm>
-          <a:prstGeom prst="rect">
-            <a:avLst/>
-          </a:prstGeom>
-          <a:solidFill>
-            <a:schemeClr val="accent6">
-              <a:lumMod val="75000"/>
-            </a:schemeClr>
-          </a:solidFill>
-          <a:ln w="19050">
-            <a:solidFill>
-              <a:schemeClr val="accent6">
-                <a:lumMod val="75000"/>
-              </a:schemeClr>
-            </a:solidFill>
-          </a:ln>
-          <a:effectLst/>
-        </p:spPr>
-        <p:style>
-          <a:lnRef idx="1">
-            <a:schemeClr val="accent2"/>
-          </a:lnRef>
-          <a:fillRef idx="2">
-            <a:schemeClr val="accent2"/>
-          </a:fillRef>
-          <a:effectRef idx="1">
-            <a:schemeClr val="accent2"/>
-          </a:effectRef>
-          <a:fontRef idx="minor">
-            <a:schemeClr val="dk1"/>
-          </a:fontRef>
-        </p:style>
-        <p:txBody>
-          <a:bodyPr rtlCol="0" anchor="ctr"/>
-          <a:lstStyle/>
-          <a:p>
-            <a:pPr algn="ctr"/>
-            <a:r>
-              <a:rPr lang="en-US" sz="1600" dirty="0" smtClean="0">
-                <a:solidFill>
-                  <a:schemeClr val="bg1"/>
-                </a:solidFill>
-              </a:rPr>
-              <a:t>:Storage</a:t>
-            </a:r>
-            <a:endParaRPr lang="en-SG" sz="1600" dirty="0">
-              <a:solidFill>
-                <a:schemeClr val="bg1"/>
-              </a:solidFill>
-            </a:endParaRPr>
-          </a:p>
-        </p:txBody>
-      </p:sp>
-      <p:cxnSp>
-        <p:nvCxnSpPr>
-          <p:cNvPr id="54" name="Straight Connector 53"/>
-          <p:cNvCxnSpPr/>
-          <p:nvPr/>
-        </p:nvCxnSpPr>
-        <p:spPr>
-          <a:xfrm>
-            <a:off x="7916995" y="4641993"/>
-            <a:ext cx="0" cy="1723059"/>
-          </a:xfrm>
-          <a:prstGeom prst="line">
-            <a:avLst/>
-          </a:prstGeom>
-          <a:ln w="19050">
-            <a:solidFill>
-              <a:schemeClr val="accent6">
-                <a:lumMod val="75000"/>
-              </a:schemeClr>
-            </a:solidFill>
-            <a:prstDash val="sysDash"/>
-          </a:ln>
-          <a:effectLst/>
-        </p:spPr>
-        <p:style>
-          <a:lnRef idx="1">
-            <a:schemeClr val="accent1"/>
-          </a:lnRef>
-          <a:fillRef idx="2">
-            <a:schemeClr val="accent1"/>
-          </a:fillRef>
-          <a:effectRef idx="1">
-            <a:schemeClr val="accent1"/>
-          </a:effectRef>
-          <a:fontRef idx="minor">
-            <a:schemeClr val="dk1"/>
-          </a:fontRef>
-        </p:style>
-      </p:cxnSp>
-      <p:sp>
-        <p:nvSpPr>
-          <p:cNvPr id="55" name="Rectangle 54"/>
-          <p:cNvSpPr/>
-          <p:nvPr/>
-        </p:nvSpPr>
-        <p:spPr>
-          <a:xfrm>
-            <a:off x="7844987" y="5335662"/>
-            <a:ext cx="124478" cy="287409"/>
-          </a:xfrm>
-          <a:prstGeom prst="rect">
-            <a:avLst/>
-          </a:prstGeom>
-          <a:solidFill>
-            <a:schemeClr val="accent6">
-              <a:lumMod val="75000"/>
-            </a:schemeClr>
-          </a:solidFill>
-          <a:ln>
-            <a:solidFill>
-              <a:schemeClr val="accent6">
-                <a:lumMod val="75000"/>
-              </a:schemeClr>
-            </a:solidFill>
-          </a:ln>
-          <a:effectLst/>
-        </p:spPr>
-        <p:style>
-          <a:lnRef idx="1">
-            <a:schemeClr val="accent3"/>
-          </a:lnRef>
-          <a:fillRef idx="2">
-            <a:schemeClr val="accent3"/>
-          </a:fillRef>
-          <a:effectRef idx="1">
-            <a:schemeClr val="accent3"/>
-          </a:effectRef>
-          <a:fontRef idx="minor">
-            <a:schemeClr val="dk1"/>
-          </a:fontRef>
-        </p:style>
-        <p:txBody>
-          <a:bodyPr rtlCol="0" anchor="ctr"/>
-          <a:lstStyle/>
-          <a:p>
-            <a:pPr algn="ctr"/>
-            <a:endParaRPr lang="en-SG" sz="1400">
-              <a:solidFill>
-                <a:schemeClr val="dk1"/>
-              </a:solidFill>
-            </a:endParaRPr>
-          </a:p>
-        </p:txBody>
-      </p:sp>
-      <p:sp>
-        <p:nvSpPr>
-          <p:cNvPr id="62" name="TextBox 61"/>
-          <p:cNvSpPr txBox="1"/>
-          <p:nvPr/>
-        </p:nvSpPr>
-        <p:spPr>
-          <a:xfrm>
-            <a:off x="1810094" y="4797674"/>
-            <a:ext cx="2716635" cy="215444"/>
-          </a:xfrm>
-          <a:prstGeom prst="rect">
-            <a:avLst/>
-          </a:prstGeom>
-          <a:noFill/>
-        </p:spPr>
-        <p:txBody>
-          <a:bodyPr wrap="square" lIns="0" tIns="0" rIns="0" bIns="0" rtlCol="0">
-            <a:spAutoFit/>
-          </a:bodyPr>
-          <a:lstStyle/>
-          <a:p>
-            <a:r>
-              <a:rPr lang="en-US" sz="1400" dirty="0" smtClean="0">
-                <a:solidFill>
-                  <a:schemeClr val="accent5">
-                    <a:lumMod val="75000"/>
-                  </a:schemeClr>
-                </a:solidFill>
-              </a:rPr>
-              <a:t>post(</a:t>
-            </a:r>
-            <a:r>
-              <a:rPr lang="en-US" sz="1400" dirty="0" err="1" smtClean="0">
-                <a:solidFill>
-                  <a:schemeClr val="accent5">
-                    <a:lumMod val="75000"/>
-                  </a:schemeClr>
-                </a:solidFill>
-              </a:rPr>
-              <a:t>AddressBookChangedEvent</a:t>
-            </a:r>
-            <a:r>
-              <a:rPr lang="en-US" sz="1400" dirty="0" smtClean="0">
-                <a:solidFill>
-                  <a:schemeClr val="accent5">
-                    <a:lumMod val="75000"/>
-                  </a:schemeClr>
-                </a:solidFill>
-              </a:rPr>
-              <a:t>)</a:t>
-            </a:r>
-            <a:endParaRPr lang="en-US" sz="1400" dirty="0">
-              <a:solidFill>
-                <a:schemeClr val="accent5">
-                  <a:lumMod val="75000"/>
-                </a:schemeClr>
-              </a:solidFill>
-            </a:endParaRPr>
-          </a:p>
-        </p:txBody>
-      </p:sp>
-      <p:cxnSp>
-        <p:nvCxnSpPr>
-          <p:cNvPr id="63" name="Straight Arrow Connector 62"/>
-          <p:cNvCxnSpPr/>
-          <p:nvPr/>
-        </p:nvCxnSpPr>
-        <p:spPr>
-          <a:xfrm flipH="1">
-            <a:off x="4526729" y="5623071"/>
-            <a:ext cx="3383941" cy="0"/>
-          </a:xfrm>
-          <a:prstGeom prst="straightConnector1">
-            <a:avLst/>
-          </a:prstGeom>
-          <a:ln w="19050">
-            <a:solidFill>
-              <a:schemeClr val="accent6">
-                <a:lumMod val="75000"/>
-              </a:schemeClr>
-            </a:solidFill>
-            <a:prstDash val="sysDash"/>
-            <a:headEnd type="none" w="med" len="med"/>
-            <a:tailEnd type="arrow" w="med" len="med"/>
-          </a:ln>
-        </p:spPr>
-        <p:style>
-          <a:lnRef idx="1">
-            <a:schemeClr val="accent1"/>
-          </a:lnRef>
-          <a:fillRef idx="0">
-            <a:schemeClr val="accent1"/>
-          </a:fillRef>
-          <a:effectRef idx="0">
-            <a:schemeClr val="accent1"/>
-          </a:effectRef>
-          <a:fontRef idx="minor">
-            <a:schemeClr val="tx1"/>
-          </a:fontRef>
-        </p:style>
-      </p:cxnSp>
-      <p:sp>
-        <p:nvSpPr>
-          <p:cNvPr id="66" name="Rectangle 62"/>
-          <p:cNvSpPr/>
-          <p:nvPr/>
-        </p:nvSpPr>
-        <p:spPr>
-          <a:xfrm>
-            <a:off x="3791146" y="4295233"/>
-            <a:ext cx="1371600" cy="346760"/>
-          </a:xfrm>
-          <a:prstGeom prst="rect">
-            <a:avLst/>
-          </a:prstGeom>
-          <a:solidFill>
-            <a:schemeClr val="accent5">
-              <a:lumMod val="75000"/>
-            </a:schemeClr>
-          </a:solidFill>
-          <a:ln w="19050">
-            <a:solidFill>
-              <a:schemeClr val="accent5">
-                <a:lumMod val="75000"/>
-              </a:schemeClr>
-            </a:solidFill>
-          </a:ln>
-          <a:effectLst/>
-        </p:spPr>
-        <p:style>
-          <a:lnRef idx="1">
-            <a:schemeClr val="accent2"/>
-          </a:lnRef>
-          <a:fillRef idx="2">
-            <a:schemeClr val="accent2"/>
-          </a:fillRef>
-          <a:effectRef idx="1">
-            <a:schemeClr val="accent2"/>
-          </a:effectRef>
-          <a:fontRef idx="minor">
-            <a:schemeClr val="dk1"/>
-          </a:fontRef>
-        </p:style>
-        <p:txBody>
-          <a:bodyPr rtlCol="0" anchor="ctr"/>
-          <a:lstStyle/>
-          <a:p>
-            <a:pPr algn="ctr"/>
-            <a:r>
-              <a:rPr lang="en-US" sz="1600" dirty="0" smtClean="0">
-                <a:solidFill>
-                  <a:schemeClr val="bg1"/>
-                </a:solidFill>
-              </a:rPr>
-              <a:t>:</a:t>
-            </a:r>
-            <a:r>
-              <a:rPr lang="en-US" sz="1600" dirty="0" err="1" smtClean="0">
+              <a:rPr lang="en-US" sz="1600" dirty="0" err="1">
                 <a:solidFill>
                   <a:schemeClr val="bg1"/>
                 </a:solidFill>
@@ -5307,17 +5021,17 @@
           <a:lstStyle/>
           <a:p>
             <a:r>
-              <a:rPr lang="en-US" sz="1400" dirty="0" err="1" smtClean="0">
+              <a:rPr lang="en-US" sz="1400" dirty="0" err="1">
                 <a:solidFill>
                   <a:schemeClr val="accent6">
                     <a:lumMod val="75000"/>
                   </a:schemeClr>
                 </a:solidFill>
               </a:rPr>
-              <a:t>handleAddresssBookChangedEvent</a:t>
-            </a:r>
-            <a:r>
-              <a:rPr lang="en-US" sz="1400" dirty="0" smtClean="0">
+              <a:t>handleEntryBookChangedEvent</a:t>
+            </a:r>
+            <a:r>
+              <a:rPr lang="en-US" sz="1400" dirty="0">
                 <a:solidFill>
                   <a:schemeClr val="accent6">
                     <a:lumMod val="75000"/>
@@ -5326,13 +5040,6 @@
               </a:rPr>
               <a:t>()</a:t>
             </a:r>
-            <a:endParaRPr lang="en-US" sz="1400" dirty="0">
-              <a:solidFill>
-                <a:schemeClr val="accent6">
-                  <a:lumMod val="75000"/>
-                </a:schemeClr>
-              </a:solidFill>
-            </a:endParaRPr>
           </a:p>
         </p:txBody>
       </p:sp>
@@ -5417,7 +5124,7 @@
           <a:p>
             <a:pPr algn="ctr"/>
             <a:r>
-              <a:rPr lang="en-US" sz="1600" dirty="0" smtClean="0">
+              <a:rPr lang="en-US" sz="1600" dirty="0">
                 <a:solidFill>
                   <a:schemeClr val="bg1"/>
                 </a:solidFill>
@@ -5620,26 +5327,21 @@
           <a:lstStyle/>
           <a:p>
             <a:r>
-              <a:rPr lang="en-US" sz="1400" dirty="0" err="1" smtClean="0">
+              <a:rPr lang="en-US" sz="1400" dirty="0" err="1">
                 <a:solidFill>
                   <a:srgbClr val="00B050"/>
                 </a:solidFill>
               </a:rPr>
-              <a:t>handleAddresssBookChangedEvent</a:t>
-            </a:r>
-            <a:r>
-              <a:rPr lang="en-US" sz="1400" dirty="0" smtClean="0">
+              <a:t>handleEntryBookChangedEvent</a:t>
+            </a:r>
+            <a:r>
+              <a:rPr lang="en-US" sz="1400" dirty="0">
                 <a:solidFill>
                   <a:srgbClr val="00B050"/>
                 </a:solidFill>
               </a:rPr>
               <a:t>()</a:t>
             </a:r>
-            <a:endParaRPr lang="en-US" sz="1400" dirty="0">
-              <a:solidFill>
-                <a:srgbClr val="00B050"/>
-              </a:solidFill>
-            </a:endParaRPr>
           </a:p>
         </p:txBody>
       </p:sp>
@@ -5826,18 +5528,13 @@
           <a:p>
             <a:pPr algn="r"/>
             <a:r>
-              <a:rPr lang="en-US" sz="1400" dirty="0" smtClean="0">
+              <a:rPr lang="en-US" sz="1400" dirty="0">
                 <a:solidFill>
                   <a:srgbClr val="00B050"/>
                 </a:solidFill>
               </a:rPr>
               <a:t>Update status bar</a:t>
             </a:r>
-            <a:endParaRPr lang="en-US" sz="1400" dirty="0">
-              <a:solidFill>
-                <a:srgbClr val="00B050"/>
-              </a:solidFill>
-            </a:endParaRPr>
           </a:p>
         </p:txBody>
       </p:sp>
@@ -5849,7 +5546,7 @@
         </p:nvGrpSpPr>
         <p:grpSpPr>
           <a:xfrm flipH="1">
-            <a:off x="7936842" y="5335662"/>
+            <a:off x="8119843" y="1866037"/>
             <a:ext cx="217349" cy="270072"/>
             <a:chOff x="1028134" y="5612032"/>
             <a:chExt cx="217349" cy="270072"/>
@@ -6012,7 +5709,7 @@
         </p:nvSpPr>
         <p:spPr>
           <a:xfrm>
-            <a:off x="8223953" y="5180992"/>
+            <a:off x="8406954" y="1711367"/>
             <a:ext cx="539047" cy="430887"/>
           </a:xfrm>
           <a:prstGeom prst="rect">
@@ -6027,7 +5724,7 @@
           <a:lstStyle/>
           <a:p>
             <a:r>
-              <a:rPr lang="en-US" sz="1400" dirty="0" smtClean="0">
+              <a:rPr lang="en-US" sz="1400" dirty="0">
                 <a:solidFill>
                   <a:schemeClr val="accent6">
                     <a:lumMod val="75000"/>
@@ -6037,7 +5734,7 @@
               <a:t>Save </a:t>
             </a:r>
             <a:br>
-              <a:rPr lang="en-US" sz="1400" dirty="0" smtClean="0">
+              <a:rPr lang="en-US" sz="1400" dirty="0">
                 <a:solidFill>
                   <a:schemeClr val="accent6">
                     <a:lumMod val="75000"/>
@@ -6046,7 +5743,7 @@
               </a:rPr>
             </a:br>
             <a:r>
-              <a:rPr lang="en-US" sz="1400" dirty="0" smtClean="0">
+              <a:rPr lang="en-US" sz="1400" dirty="0">
                 <a:solidFill>
                   <a:schemeClr val="accent6">
                     <a:lumMod val="75000"/>
@@ -6055,16 +5752,128 @@
               </a:rPr>
               <a:t>to file</a:t>
             </a:r>
-            <a:endParaRPr lang="en-US" sz="1400" dirty="0">
-              <a:solidFill>
-                <a:schemeClr val="accent6">
-                  <a:lumMod val="75000"/>
-                </a:schemeClr>
-              </a:solidFill>
-            </a:endParaRPr>
-          </a:p>
-        </p:txBody>
-      </p:sp>
+          </a:p>
+        </p:txBody>
+      </p:sp>
+      <p:sp>
+        <p:nvSpPr>
+          <p:cNvPr id="65" name="TextBox 64">
+            <a:extLst>
+              <a:ext uri="{FF2B5EF4-FFF2-40B4-BE49-F238E27FC236}">
+                <a16:creationId xmlns:a16="http://schemas.microsoft.com/office/drawing/2014/main" id="{56DBE29C-339E-4DF0-9B3F-D28DB37A3EDD}"/>
+              </a:ext>
+            </a:extLst>
+          </p:cNvPr>
+          <p:cNvSpPr txBox="1"/>
+          <p:nvPr/>
+        </p:nvSpPr>
+        <p:spPr>
+          <a:xfrm>
+            <a:off x="6009591" y="1633650"/>
+            <a:ext cx="2014412" cy="215444"/>
+          </a:xfrm>
+          <a:prstGeom prst="rect">
+            <a:avLst/>
+          </a:prstGeom>
+          <a:noFill/>
+        </p:spPr>
+        <p:txBody>
+          <a:bodyPr wrap="square" lIns="0" tIns="0" rIns="0" bIns="0" rtlCol="0">
+            <a:spAutoFit/>
+          </a:bodyPr>
+          <a:lstStyle/>
+          <a:p>
+            <a:r>
+              <a:rPr lang="en-US" sz="1400" dirty="0" err="1">
+                <a:solidFill>
+                  <a:schemeClr val="accent6">
+                    <a:lumMod val="75000"/>
+                  </a:schemeClr>
+                </a:solidFill>
+              </a:rPr>
+              <a:t>saveEntryBook</a:t>
+            </a:r>
+            <a:r>
+              <a:rPr lang="en-US" sz="1400" dirty="0">
+                <a:solidFill>
+                  <a:schemeClr val="accent6">
+                    <a:lumMod val="75000"/>
+                  </a:schemeClr>
+                </a:solidFill>
+              </a:rPr>
+              <a:t>(</a:t>
+            </a:r>
+            <a:r>
+              <a:rPr lang="en-US" sz="1400" dirty="0" err="1">
+                <a:solidFill>
+                  <a:schemeClr val="accent6">
+                    <a:lumMod val="75000"/>
+                  </a:schemeClr>
+                </a:solidFill>
+              </a:rPr>
+              <a:t>EntryBook</a:t>
+            </a:r>
+            <a:r>
+              <a:rPr lang="en-US" sz="1400" dirty="0">
+                <a:solidFill>
+                  <a:schemeClr val="accent6">
+                    <a:lumMod val="75000"/>
+                  </a:schemeClr>
+                </a:solidFill>
+              </a:rPr>
+              <a:t>)</a:t>
+            </a:r>
+          </a:p>
+        </p:txBody>
+      </p:sp>
+      <p:cxnSp>
+        <p:nvCxnSpPr>
+          <p:cNvPr id="71" name="Straight Arrow Connector 70">
+            <a:extLst>
+              <a:ext uri="{FF2B5EF4-FFF2-40B4-BE49-F238E27FC236}">
+                <a16:creationId xmlns:a16="http://schemas.microsoft.com/office/drawing/2014/main" id="{8D13E31B-6C9D-4E84-BBA1-AC4372EAE3C3}"/>
+              </a:ext>
+            </a:extLst>
+          </p:cNvPr>
+          <p:cNvCxnSpPr>
+            <a:cxnSpLocks/>
+          </p:cNvCxnSpPr>
+          <p:nvPr/>
+        </p:nvCxnSpPr>
+        <p:spPr>
+          <a:xfrm>
+            <a:off x="5924158" y="2136109"/>
+            <a:ext cx="2099845" cy="0"/>
+          </a:xfrm>
+          <a:prstGeom prst="straightConnector1">
+            <a:avLst/>
+          </a:prstGeom>
+          <a:ln w="19050">
+            <a:solidFill>
+              <a:schemeClr val="accent6">
+                <a:lumMod val="75000"/>
+              </a:schemeClr>
+            </a:solidFill>
+            <a:prstDash val="sysDash"/>
+            <a:headEnd type="arrow" w="med" len="med"/>
+            <a:tailEnd type="none" w="med" len="med"/>
+          </a:ln>
+        </p:spPr>
+        <p:style>
+          <a:lnRef idx="1">
+            <a:schemeClr val="accent1"/>
+          </a:lnRef>
+          <a:fillRef idx="0">
+            <a:schemeClr val="accent1"/>
+          </a:fillRef>
+          <a:effectRef idx="0">
+            <a:schemeClr val="accent1"/>
+          </a:effectRef>
+          <a:fontRef idx="minor">
+            <a:schemeClr val="tx1"/>
+          </a:fontRef>
+        </p:style>
+      </p:cxnSp>
     </p:spTree>
     <p:extLst>
       <p:ext uri="{BB962C8B-B14F-4D97-AF65-F5344CB8AC3E}">

</xml_diff>